<commit_message>
+ add final .pdf .docx .pptx
</commit_message>
<xml_diff>
--- a/train-validate-test-repeat-vitmav45-beszamolo.pptx
+++ b/train-validate-test-repeat-vitmav45-beszamolo.pptx
@@ -2,49 +2,49 @@
 <file path=ppt/presentation.xml><?xml version="1.0" encoding="utf-8"?>
 <p:presentation xmlns:a="http://schemas.openxmlformats.org/drawingml/2006/main" xmlns:r="http://schemas.openxmlformats.org/officeDocument/2006/relationships" xmlns:mc="http://schemas.openxmlformats.org/markup-compatibility/2006" xmlns:mv="urn:schemas-microsoft-com:mac:vml" xmlns:p="http://schemas.openxmlformats.org/presentationml/2006/main" xmlns:c="http://schemas.openxmlformats.org/drawingml/2006/chart" xmlns:dgm="http://schemas.openxmlformats.org/drawingml/2006/diagram" xmlns:o="urn:schemas-microsoft-com:office:office" xmlns:v="urn:schemas-microsoft-com:vml" xmlns:pvml="urn:schemas-microsoft-com:office:powerpoint" xmlns:com="http://schemas.openxmlformats.org/drawingml/2006/compatibility" xmlns:p14="http://schemas.microsoft.com/office/powerpoint/2010/main" autoCompressPictures="0" embedTrueTypeFonts="1" strictFirstAndLastChars="0" saveSubsetFonts="1">
   <p:sldMasterIdLst>
-    <p:sldMasterId id="2147483670" r:id="rId5"/>
-    <p:sldMasterId id="2147483671" r:id="rId6"/>
+    <p:sldMasterId id="2147483670" r:id="rId4"/>
+    <p:sldMasterId id="2147483671" r:id="rId5"/>
   </p:sldMasterIdLst>
   <p:notesMasterIdLst>
-    <p:notesMasterId r:id="rId7"/>
+    <p:notesMasterId r:id="rId6"/>
   </p:notesMasterIdLst>
   <p:sldIdLst>
-    <p:sldId id="256" r:id="rId8"/>
-    <p:sldId id="257" r:id="rId9"/>
-    <p:sldId id="258" r:id="rId10"/>
-    <p:sldId id="259" r:id="rId11"/>
-    <p:sldId id="260" r:id="rId12"/>
-    <p:sldId id="261" r:id="rId13"/>
-    <p:sldId id="262" r:id="rId14"/>
-    <p:sldId id="263" r:id="rId15"/>
-    <p:sldId id="264" r:id="rId16"/>
-    <p:sldId id="265" r:id="rId17"/>
-    <p:sldId id="266" r:id="rId18"/>
-    <p:sldId id="267" r:id="rId19"/>
-    <p:sldId id="268" r:id="rId20"/>
-    <p:sldId id="269" r:id="rId21"/>
-    <p:sldId id="270" r:id="rId22"/>
-    <p:sldId id="271" r:id="rId23"/>
-    <p:sldId id="272" r:id="rId24"/>
-    <p:sldId id="273" r:id="rId25"/>
-    <p:sldId id="274" r:id="rId26"/>
-    <p:sldId id="275" r:id="rId27"/>
-    <p:sldId id="276" r:id="rId28"/>
-    <p:sldId id="277" r:id="rId29"/>
-    <p:sldId id="278" r:id="rId30"/>
-    <p:sldId id="279" r:id="rId31"/>
-    <p:sldId id="280" r:id="rId32"/>
-    <p:sldId id="281" r:id="rId33"/>
+    <p:sldId id="256" r:id="rId7"/>
+    <p:sldId id="257" r:id="rId8"/>
+    <p:sldId id="258" r:id="rId9"/>
+    <p:sldId id="259" r:id="rId10"/>
+    <p:sldId id="260" r:id="rId11"/>
+    <p:sldId id="261" r:id="rId12"/>
+    <p:sldId id="262" r:id="rId13"/>
+    <p:sldId id="263" r:id="rId14"/>
+    <p:sldId id="264" r:id="rId15"/>
+    <p:sldId id="265" r:id="rId16"/>
+    <p:sldId id="266" r:id="rId17"/>
+    <p:sldId id="267" r:id="rId18"/>
+    <p:sldId id="268" r:id="rId19"/>
+    <p:sldId id="269" r:id="rId20"/>
+    <p:sldId id="270" r:id="rId21"/>
+    <p:sldId id="271" r:id="rId22"/>
+    <p:sldId id="272" r:id="rId23"/>
+    <p:sldId id="273" r:id="rId24"/>
+    <p:sldId id="274" r:id="rId25"/>
+    <p:sldId id="275" r:id="rId26"/>
+    <p:sldId id="276" r:id="rId27"/>
+    <p:sldId id="277" r:id="rId28"/>
+    <p:sldId id="278" r:id="rId29"/>
+    <p:sldId id="279" r:id="rId30"/>
+    <p:sldId id="280" r:id="rId31"/>
+    <p:sldId id="281" r:id="rId32"/>
   </p:sldIdLst>
   <p:sldSz cy="6858000" cx="9144000"/>
   <p:notesSz cx="6858000" cy="9144000"/>
   <p:embeddedFontLst>
     <p:embeddedFont>
       <p:font typeface="Roboto"/>
-      <p:regular r:id="rId34"/>
-      <p:bold r:id="rId35"/>
-      <p:italic r:id="rId36"/>
-      <p:boldItalic r:id="rId37"/>
+      <p:regular r:id="rId33"/>
+      <p:bold r:id="rId34"/>
+      <p:italic r:id="rId35"/>
+      <p:boldItalic r:id="rId36"/>
     </p:embeddedFont>
   </p:embeddedFontLst>
   <p:defaultTextStyle>
@@ -250,115 +250,6 @@
     </a:lvl9pPr>
   </p:defaultTextStyle>
 </p:presentation>
-</file>
-
-<file path=ppt/commentAuthors.xml><?xml version="1.0" encoding="utf-8"?>
-<p:cmAuthorLst xmlns:a="http://schemas.openxmlformats.org/drawingml/2006/main" xmlns:r="http://schemas.openxmlformats.org/officeDocument/2006/relationships" xmlns:mc="http://schemas.openxmlformats.org/markup-compatibility/2006" xmlns:mv="urn:schemas-microsoft-com:mac:vml" xmlns:p="http://schemas.openxmlformats.org/presentationml/2006/main" xmlns:c="http://schemas.openxmlformats.org/drawingml/2006/chart" xmlns:dgm="http://schemas.openxmlformats.org/drawingml/2006/diagram" xmlns:o="urn:schemas-microsoft-com:office:office" xmlns:v="urn:schemas-microsoft-com:vml" xmlns:pvml="urn:schemas-microsoft-com:office:powerpoint" xmlns:com="http://schemas.openxmlformats.org/drawingml/2006/compatibility" xmlns:p14="http://schemas.microsoft.com/office/powerpoint/2010/main">
-  <p:cmAuthor clrIdx="0" id="0" initials="" lastIdx="8" name="Norbert Bajkó"/>
-  <p:cmAuthor clrIdx="1" id="1" initials="" lastIdx="5" name="Bence Mikulás"/>
-</p:cmAuthorLst>
-</file>
-
-<file path=ppt/comments/comment1.xml><?xml version="1.0" encoding="utf-8"?>
-<p:cmLst xmlns:a="http://schemas.openxmlformats.org/drawingml/2006/main" xmlns:r="http://schemas.openxmlformats.org/officeDocument/2006/relationships" xmlns:mc="http://schemas.openxmlformats.org/markup-compatibility/2006" xmlns:mv="urn:schemas-microsoft-com:mac:vml" xmlns:p="http://schemas.openxmlformats.org/presentationml/2006/main" xmlns:c="http://schemas.openxmlformats.org/drawingml/2006/chart" xmlns:dgm="http://schemas.openxmlformats.org/drawingml/2006/diagram" xmlns:o="urn:schemas-microsoft-com:office:office" xmlns:v="urn:schemas-microsoft-com:vml" xmlns:pvml="urn:schemas-microsoft-com:office:powerpoint" xmlns:com="http://schemas.openxmlformats.org/drawingml/2006/compatibility" xmlns:p14="http://schemas.microsoft.com/office/powerpoint/2010/main">
-  <p:cm authorId="0" idx="1" dt="2016-11-30T13:58:23.765">
-    <p:pos x="6000" y="0"/>
-    <p:text>ezeket írjuk majd át igényesre :D</p:text>
-  </p:cm>
-</p:cmLst>
-</file>
-
-<file path=ppt/comments/comment2.xml><?xml version="1.0" encoding="utf-8"?>
-<p:cmLst xmlns:a="http://schemas.openxmlformats.org/drawingml/2006/main" xmlns:r="http://schemas.openxmlformats.org/officeDocument/2006/relationships" xmlns:mc="http://schemas.openxmlformats.org/markup-compatibility/2006" xmlns:mv="urn:schemas-microsoft-com:mac:vml" xmlns:p="http://schemas.openxmlformats.org/presentationml/2006/main" xmlns:c="http://schemas.openxmlformats.org/drawingml/2006/chart" xmlns:dgm="http://schemas.openxmlformats.org/drawingml/2006/diagram" xmlns:o="urn:schemas-microsoft-com:office:office" xmlns:v="urn:schemas-microsoft-com:vml" xmlns:pvml="urn:schemas-microsoft-com:office:powerpoint" xmlns:com="http://schemas.openxmlformats.org/drawingml/2006/compatibility" xmlns:p14="http://schemas.microsoft.com/office/powerpoint/2010/main">
-  <p:cm authorId="1" idx="1" dt="2016-12-01T01:47:14.128">
-    <p:pos x="6000" y="0"/>
-    <p:text>vegyük ki ezt a diát ha ne mtudunk vele mit csinálni</p:text>
-  </p:cm>
-  <p:cm authorId="0" idx="2" dt="2016-11-30T23:21:52.712">
-    <p:pos x="6000" y="100"/>
-    <p:text>ide mit kéne raknunk?</p:text>
-  </p:cm>
-</p:cmLst>
-</file>
-
-<file path=ppt/comments/comment3.xml><?xml version="1.0" encoding="utf-8"?>
-<p:cmLst xmlns:a="http://schemas.openxmlformats.org/drawingml/2006/main" xmlns:r="http://schemas.openxmlformats.org/officeDocument/2006/relationships" xmlns:mc="http://schemas.openxmlformats.org/markup-compatibility/2006" xmlns:mv="urn:schemas-microsoft-com:mac:vml" xmlns:p="http://schemas.openxmlformats.org/presentationml/2006/main" xmlns:c="http://schemas.openxmlformats.org/drawingml/2006/chart" xmlns:dgm="http://schemas.openxmlformats.org/drawingml/2006/diagram" xmlns:o="urn:schemas-microsoft-com:office:office" xmlns:v="urn:schemas-microsoft-com:vml" xmlns:pvml="urn:schemas-microsoft-com:office:powerpoint" xmlns:com="http://schemas.openxmlformats.org/drawingml/2006/compatibility" xmlns:p14="http://schemas.microsoft.com/office/powerpoint/2010/main">
-  <p:cm authorId="0" idx="3" dt="2016-11-30T11:58:15.268">
-    <p:pos x="6000" y="0"/>
-    <p:text>Mivel nem minden fájl van fent, kinek milyen fájlja van fent írja meg (legjobb szerintem kategóriákra szedve lenne pl festő megállapítás, stílus rajzolás,  weblap)</p:text>
-  </p:cm>
-  <p:cm authorId="0" idx="4" dt="2016-11-30T11:57:11.061">
-    <p:pos x="6000" y="100"/>
-    <p:text>S/W részhez még írjatok ha van valami, meg nem tudom a zárójeles dolgokat írjuk-e</p:text>
-  </p:cm>
-</p:cmLst>
-</file>
-
-<file path=ppt/comments/comment4.xml><?xml version="1.0" encoding="utf-8"?>
-<p:cmLst xmlns:a="http://schemas.openxmlformats.org/drawingml/2006/main" xmlns:r="http://schemas.openxmlformats.org/officeDocument/2006/relationships" xmlns:mc="http://schemas.openxmlformats.org/markup-compatibility/2006" xmlns:mv="urn:schemas-microsoft-com:mac:vml" xmlns:p="http://schemas.openxmlformats.org/presentationml/2006/main" xmlns:c="http://schemas.openxmlformats.org/drawingml/2006/chart" xmlns:dgm="http://schemas.openxmlformats.org/drawingml/2006/diagram" xmlns:o="urn:schemas-microsoft-com:office:office" xmlns:v="urn:schemas-microsoft-com:vml" xmlns:pvml="urn:schemas-microsoft-com:office:powerpoint" xmlns:com="http://schemas.openxmlformats.org/drawingml/2006/compatibility" xmlns:p14="http://schemas.microsoft.com/office/powerpoint/2010/main">
-  <p:cm authorId="1" idx="2" dt="2016-12-01T01:56:53.011">
-    <p:pos x="6000" y="0"/>
-    <p:text>aki utoljára módosít a számokon adja újra össze :D</p:text>
-  </p:cm>
-</p:cmLst>
-</file>
-
-<file path=ppt/comments/comment5.xml><?xml version="1.0" encoding="utf-8"?>
-<p:cmLst xmlns:a="http://schemas.openxmlformats.org/drawingml/2006/main" xmlns:r="http://schemas.openxmlformats.org/officeDocument/2006/relationships" xmlns:mc="http://schemas.openxmlformats.org/markup-compatibility/2006" xmlns:mv="urn:schemas-microsoft-com:mac:vml" xmlns:p="http://schemas.openxmlformats.org/presentationml/2006/main" xmlns:c="http://schemas.openxmlformats.org/drawingml/2006/chart" xmlns:dgm="http://schemas.openxmlformats.org/drawingml/2006/diagram" xmlns:o="urn:schemas-microsoft-com:office:office" xmlns:v="urn:schemas-microsoft-com:vml" xmlns:pvml="urn:schemas-microsoft-com:office:powerpoint" xmlns:com="http://schemas.openxmlformats.org/drawingml/2006/compatibility" xmlns:p14="http://schemas.microsoft.com/office/powerpoint/2010/main">
-  <p:cm authorId="1" idx="3" dt="2016-11-30T14:50:56.585">
-    <p:pos x="6000" y="0"/>
-    <p:text>Írjátok meg, hogy a nyers adatot hogyan készítitek elő a mély hálóknak be- és kimenetei számára.
-Ha szükséges az adatok tisztítására, előfeldolgozása, akkor azt is ide írjátok.
-(ide akár rövid forráskód részek is jöhetnek)</p:text>
-  </p:cm>
-  <p:cm authorId="0" idx="5" dt="2016-11-30T14:44:58.017">
-    <p:pos x="6000" y="100"/>
-    <p:text>Adatok alatt a képeket érted? és szintaktikán meg a csv-t?</p:text>
-  </p:cm>
-  <p:cm authorId="1" idx="4" dt="2016-11-30T14:50:56.585">
-    <p:pos x="6000" y="200"/>
-    <p:text>Az adatok alatt a képeket, a szintaktikán meg a megfelelő numpy tömböt. Nem egyértelmű, jogos, javítom.</p:text>
-  </p:cm>
-</p:cmLst>
-</file>
-
-<file path=ppt/comments/comment6.xml><?xml version="1.0" encoding="utf-8"?>
-<p:cmLst xmlns:a="http://schemas.openxmlformats.org/drawingml/2006/main" xmlns:r="http://schemas.openxmlformats.org/officeDocument/2006/relationships" xmlns:mc="http://schemas.openxmlformats.org/markup-compatibility/2006" xmlns:mv="urn:schemas-microsoft-com:mac:vml" xmlns:p="http://schemas.openxmlformats.org/presentationml/2006/main" xmlns:c="http://schemas.openxmlformats.org/drawingml/2006/chart" xmlns:dgm="http://schemas.openxmlformats.org/drawingml/2006/diagram" xmlns:o="urn:schemas-microsoft-com:office:office" xmlns:v="urn:schemas-microsoft-com:vml" xmlns:pvml="urn:schemas-microsoft-com:office:powerpoint" xmlns:com="http://schemas.openxmlformats.org/drawingml/2006/compatibility" xmlns:p14="http://schemas.microsoft.com/office/powerpoint/2010/main">
-  <p:cm authorId="1" idx="5" dt="2016-11-30T14:33:06.340">
-    <p:pos x="6000" y="0"/>
-    <p:text>Ide írjátok meg, hogy milyen háló architektúrákat használtatok. 
-Mondjátok el, hogy az adott háló architektúrát miért gondoltátok megfelelőnek az adott feladathoz (korábbi megoldások, saját elképzelés, stb.).
-Ha órán nem volt az adott architektúráról szó, akkor röviden ismertessétek, hogy mit tud ez a háló.
-(ide rövid forráskód részek is jöhetnek)</p:text>
-  </p:cm>
-</p:cmLst>
-</file>
-
-<file path=ppt/comments/comment7.xml><?xml version="1.0" encoding="utf-8"?>
-<p:cmLst xmlns:a="http://schemas.openxmlformats.org/drawingml/2006/main" xmlns:r="http://schemas.openxmlformats.org/officeDocument/2006/relationships" xmlns:mc="http://schemas.openxmlformats.org/markup-compatibility/2006" xmlns:mv="urn:schemas-microsoft-com:mac:vml" xmlns:p="http://schemas.openxmlformats.org/presentationml/2006/main" xmlns:c="http://schemas.openxmlformats.org/drawingml/2006/chart" xmlns:dgm="http://schemas.openxmlformats.org/drawingml/2006/diagram" xmlns:o="urn:schemas-microsoft-com:office:office" xmlns:v="urn:schemas-microsoft-com:vml" xmlns:pvml="urn:schemas-microsoft-com:office:powerpoint" xmlns:com="http://schemas.openxmlformats.org/drawingml/2006/compatibility" xmlns:p14="http://schemas.microsoft.com/office/powerpoint/2010/main">
-  <p:cm authorId="0" idx="6" dt="2016-11-30T17:00:00.922">
-    <p:pos x="6000" y="0"/>
-    <p:text>KELL MÉG</p:text>
-  </p:cm>
-</p:cmLst>
-</file>
-
-<file path=ppt/comments/comment8.xml><?xml version="1.0" encoding="utf-8"?>
-<p:cmLst xmlns:a="http://schemas.openxmlformats.org/drawingml/2006/main" xmlns:r="http://schemas.openxmlformats.org/officeDocument/2006/relationships" xmlns:mc="http://schemas.openxmlformats.org/markup-compatibility/2006" xmlns:mv="urn:schemas-microsoft-com:mac:vml" xmlns:p="http://schemas.openxmlformats.org/presentationml/2006/main" xmlns:c="http://schemas.openxmlformats.org/drawingml/2006/chart" xmlns:dgm="http://schemas.openxmlformats.org/drawingml/2006/diagram" xmlns:o="urn:schemas-microsoft-com:office:office" xmlns:v="urn:schemas-microsoft-com:vml" xmlns:pvml="urn:schemas-microsoft-com:office:powerpoint" xmlns:com="http://schemas.openxmlformats.org/drawingml/2006/compatibility" xmlns:p14="http://schemas.microsoft.com/office/powerpoint/2010/main">
-  <p:cm authorId="0" idx="7" dt="2016-11-30T17:01:16.662">
-    <p:pos x="6000" y="0"/>
-    <p:text>MÉG KELL</p:text>
-  </p:cm>
-</p:cmLst>
-</file>
-
-<file path=ppt/comments/comment9.xml><?xml version="1.0" encoding="utf-8"?>
-<p:cmLst xmlns:a="http://schemas.openxmlformats.org/drawingml/2006/main" xmlns:r="http://schemas.openxmlformats.org/officeDocument/2006/relationships" xmlns:mc="http://schemas.openxmlformats.org/markup-compatibility/2006" xmlns:mv="urn:schemas-microsoft-com:mac:vml" xmlns:p="http://schemas.openxmlformats.org/presentationml/2006/main" xmlns:c="http://schemas.openxmlformats.org/drawingml/2006/chart" xmlns:dgm="http://schemas.openxmlformats.org/drawingml/2006/diagram" xmlns:o="urn:schemas-microsoft-com:office:office" xmlns:v="urn:schemas-microsoft-com:vml" xmlns:pvml="urn:schemas-microsoft-com:office:powerpoint" xmlns:com="http://schemas.openxmlformats.org/drawingml/2006/compatibility" xmlns:p14="http://schemas.microsoft.com/office/powerpoint/2010/main">
-  <p:cm authorId="0" idx="8" dt="2016-11-30T17:01:31.690">
-    <p:pos x="6000" y="0"/>
-    <p:text>Ezt igényesre átírni</p:text>
-  </p:cm>
-</p:cmLst>
 </file>
 
 <file path=ppt/notesMasters/notesMaster1.xml><?xml version="1.0" encoding="utf-8"?>
@@ -23419,7 +23310,7 @@
           <p:nvPr/>
         </p:nvGraphicFramePr>
         <p:xfrm>
-          <a:off x="523212" y="1418312"/>
+          <a:off x="523212" y="1050650"/>
           <a:ext cx="3000000" cy="3000000"/>
         </p:xfrm>
         <a:graphic>
@@ -23427,15 +23318,15 @@
             <a:tbl>
               <a:tblPr>
                 <a:noFill/>
-                <a:tableStyleId>{D416E318-9AFB-412E-AE63-A0A0E59EB3B7}</a:tableStyleId>
+                <a:tableStyleId>{EE4A90BB-7914-41D3-B846-49A67E4F97CD}</a:tableStyleId>
               </a:tblPr>
               <a:tblGrid>
                 <a:gridCol w="1966825"/>
-                <a:gridCol w="1252075"/>
-                <a:gridCol w="1419400"/>
-                <a:gridCol w="1404225"/>
-                <a:gridCol w="1328100"/>
-                <a:gridCol w="917600"/>
+                <a:gridCol w="1236875"/>
+                <a:gridCol w="1297750"/>
+                <a:gridCol w="1328175"/>
+                <a:gridCol w="1328125"/>
+                <a:gridCol w="1130475"/>
               </a:tblGrid>
               <a:tr h="320175">
                 <a:tc>
@@ -23452,9 +23343,9 @@
                         <a:buNone/>
                       </a:pPr>
                       <a:r>
-                        <a:rPr lang="en-US" sz="1800"/>
-                        <a:t>Óraszám</a:t>
-                      </a:r>
+                        <a:t/>
+                      </a:r>
+                      <a:endParaRPr sz="1800"/>
                     </a:p>
                   </a:txBody>
                   <a:tcPr marT="91425" marB="91425" marR="91425" marL="91425" anchor="ctr">
@@ -23743,7 +23634,7 @@
                       </a:pPr>
                       <a:r>
                         <a:rPr b="1" lang="en-US" sz="1800"/>
-                        <a:t>Sum</a:t>
+                        <a:t>Szumma</a:t>
                       </a:r>
                     </a:p>
                   </a:txBody>
@@ -24450,7 +24341,7 @@
                       </a:pPr>
                       <a:r>
                         <a:rPr lang="en-US" sz="1800"/>
-                        <a:t>16</a:t>
+                        <a:t>18</a:t>
                       </a:r>
                     </a:p>
                   </a:txBody>
@@ -25260,7 +25151,7 @@
                       <a:headEnd len="med" w="med" type="none"/>
                       <a:tailEnd len="med" w="med" type="none"/>
                     </a:lnT>
-                    <a:lnB cap="flat" cmpd="sng" w="38100">
+                    <a:lnB cap="flat" cmpd="sng" w="19050">
                       <a:solidFill>
                         <a:srgbClr val="9E9E9E"/>
                       </a:solidFill>
@@ -25300,7 +25191,7 @@
                       <a:headEnd len="med" w="med" type="none"/>
                       <a:tailEnd len="med" w="med" type="none"/>
                     </a:lnL>
-                    <a:lnB cap="flat" cmpd="sng" w="38100">
+                    <a:lnB cap="flat" cmpd="sng" w="19050">
                       <a:solidFill>
                         <a:srgbClr val="9E9E9E"/>
                       </a:solidFill>
@@ -25331,7 +25222,7 @@
                     </a:p>
                   </a:txBody>
                   <a:tcPr marT="91425" marB="91425" marR="91425" marL="91425" anchor="ctr">
-                    <a:lnB cap="flat" cmpd="sng" w="38100">
+                    <a:lnB cap="flat" cmpd="sng" w="19050">
                       <a:solidFill>
                         <a:srgbClr val="9E9E9E"/>
                       </a:solidFill>
@@ -25362,7 +25253,7 @@
                     </a:p>
                   </a:txBody>
                   <a:tcPr marT="91425" marB="91425" marR="91425" marL="91425" anchor="ctr">
-                    <a:lnB cap="flat" cmpd="sng" w="38100">
+                    <a:lnB cap="flat" cmpd="sng" w="19050">
                       <a:solidFill>
                         <a:srgbClr val="9E9E9E"/>
                       </a:solidFill>
@@ -25402,7 +25293,7 @@
                       <a:headEnd len="med" w="med" type="none"/>
                       <a:tailEnd len="med" w="med" type="none"/>
                     </a:lnR>
-                    <a:lnB cap="flat" cmpd="sng" w="38100">
+                    <a:lnB cap="flat" cmpd="sng" w="19050">
                       <a:solidFill>
                         <a:srgbClr val="9E9E9E"/>
                       </a:solidFill>
@@ -25487,8 +25378,304 @@
                         <a:buNone/>
                       </a:pPr>
                       <a:r>
+                        <a:rPr lang="en-US" sz="1800"/>
+                        <a:t>Dokumentáció / egyéb</a:t>
+                      </a:r>
+                    </a:p>
+                  </a:txBody>
+                  <a:tcPr marT="91425" marB="91425" marR="91425" marL="91425" anchor="ctr">
+                    <a:lnL cap="flat" cmpd="sng" w="19050">
+                      <a:solidFill>
+                        <a:srgbClr val="9E9E9E"/>
+                      </a:solidFill>
+                      <a:prstDash val="solid"/>
+                      <a:round/>
+                      <a:headEnd len="med" w="med" type="none"/>
+                      <a:tailEnd len="med" w="med" type="none"/>
+                    </a:lnL>
+                    <a:lnR cap="flat" cmpd="sng" w="38100">
+                      <a:solidFill>
+                        <a:srgbClr val="9E9E9E"/>
+                      </a:solidFill>
+                      <a:prstDash val="solid"/>
+                      <a:round/>
+                      <a:headEnd len="med" w="med" type="none"/>
+                      <a:tailEnd len="med" w="med" type="none"/>
+                    </a:lnR>
+                    <a:lnT cap="flat" cmpd="sng" w="19050">
+                      <a:solidFill>
+                        <a:srgbClr val="9E9E9E"/>
+                      </a:solidFill>
+                      <a:prstDash val="solid"/>
+                      <a:round/>
+                      <a:headEnd len="med" w="med" type="none"/>
+                      <a:tailEnd len="med" w="med" type="none"/>
+                    </a:lnT>
+                    <a:lnB cap="flat" cmpd="sng" w="38100">
+                      <a:solidFill>
+                        <a:srgbClr val="9E9E9E"/>
+                      </a:solidFill>
+                      <a:prstDash val="solid"/>
+                      <a:round/>
+                      <a:headEnd len="med" w="med" type="none"/>
+                      <a:tailEnd len="med" w="med" type="none"/>
+                    </a:lnB>
+                  </a:tcPr>
+                </a:tc>
+                <a:tc>
+                  <a:txBody>
+                    <a:bodyPr>
+                      <a:noAutofit/>
+                    </a:bodyPr>
+                    <a:lstStyle/>
+                    <a:p>
+                      <a:pPr lvl="0" rtl="0" algn="ctr">
+                        <a:spcBef>
+                          <a:spcPts val="0"/>
+                        </a:spcBef>
+                        <a:buNone/>
+                      </a:pPr>
+                      <a:r>
+                        <a:rPr lang="en-US" sz="1800"/>
+                        <a:t>25</a:t>
+                      </a:r>
+                    </a:p>
+                  </a:txBody>
+                  <a:tcPr marT="91425" marB="91425" marR="91425" marL="91425" anchor="ctr">
+                    <a:lnL cap="flat" cmpd="sng" w="38100">
+                      <a:solidFill>
+                        <a:srgbClr val="9E9E9E"/>
+                      </a:solidFill>
+                      <a:prstDash val="solid"/>
+                      <a:round/>
+                      <a:headEnd len="med" w="med" type="none"/>
+                      <a:tailEnd len="med" w="med" type="none"/>
+                    </a:lnL>
+                    <a:lnT cap="flat" cmpd="sng" w="19050">
+                      <a:solidFill>
+                        <a:srgbClr val="9E9E9E"/>
+                      </a:solidFill>
+                      <a:prstDash val="solid"/>
+                      <a:round/>
+                      <a:headEnd len="med" w="med" type="none"/>
+                      <a:tailEnd len="med" w="med" type="none"/>
+                    </a:lnT>
+                    <a:lnB cap="flat" cmpd="sng" w="38100">
+                      <a:solidFill>
+                        <a:srgbClr val="9E9E9E"/>
+                      </a:solidFill>
+                      <a:prstDash val="solid"/>
+                      <a:round/>
+                      <a:headEnd len="med" w="med" type="none"/>
+                      <a:tailEnd len="med" w="med" type="none"/>
+                    </a:lnB>
+                  </a:tcPr>
+                </a:tc>
+                <a:tc>
+                  <a:txBody>
+                    <a:bodyPr>
+                      <a:noAutofit/>
+                    </a:bodyPr>
+                    <a:lstStyle/>
+                    <a:p>
+                      <a:pPr lvl="0" rtl="0" algn="ctr">
+                        <a:spcBef>
+                          <a:spcPts val="0"/>
+                        </a:spcBef>
+                        <a:buNone/>
+                      </a:pPr>
+                      <a:r>
+                        <a:rPr lang="en-US" sz="1800"/>
+                        <a:t>15</a:t>
+                      </a:r>
+                    </a:p>
+                  </a:txBody>
+                  <a:tcPr marT="91425" marB="91425" marR="91425" marL="91425" anchor="ctr">
+                    <a:lnT cap="flat" cmpd="sng" w="19050">
+                      <a:solidFill>
+                        <a:srgbClr val="9E9E9E"/>
+                      </a:solidFill>
+                      <a:prstDash val="solid"/>
+                      <a:round/>
+                      <a:headEnd len="med" w="med" type="none"/>
+                      <a:tailEnd len="med" w="med" type="none"/>
+                    </a:lnT>
+                    <a:lnB cap="flat" cmpd="sng" w="38100">
+                      <a:solidFill>
+                        <a:srgbClr val="9E9E9E"/>
+                      </a:solidFill>
+                      <a:prstDash val="solid"/>
+                      <a:round/>
+                      <a:headEnd len="med" w="med" type="none"/>
+                      <a:tailEnd len="med" w="med" type="none"/>
+                    </a:lnB>
+                  </a:tcPr>
+                </a:tc>
+                <a:tc>
+                  <a:txBody>
+                    <a:bodyPr>
+                      <a:noAutofit/>
+                    </a:bodyPr>
+                    <a:lstStyle/>
+                    <a:p>
+                      <a:pPr lvl="0" rtl="0" algn="ctr">
+                        <a:spcBef>
+                          <a:spcPts val="0"/>
+                        </a:spcBef>
+                        <a:buNone/>
+                      </a:pPr>
+                      <a:r>
+                        <a:rPr lang="en-US" sz="1800"/>
+                        <a:t>15</a:t>
+                      </a:r>
+                    </a:p>
+                  </a:txBody>
+                  <a:tcPr marT="91425" marB="91425" marR="91425" marL="91425" anchor="ctr">
+                    <a:lnT cap="flat" cmpd="sng" w="19050">
+                      <a:solidFill>
+                        <a:srgbClr val="9E9E9E"/>
+                      </a:solidFill>
+                      <a:prstDash val="solid"/>
+                      <a:round/>
+                      <a:headEnd len="med" w="med" type="none"/>
+                      <a:tailEnd len="med" w="med" type="none"/>
+                    </a:lnT>
+                    <a:lnB cap="flat" cmpd="sng" w="38100">
+                      <a:solidFill>
+                        <a:srgbClr val="9E9E9E"/>
+                      </a:solidFill>
+                      <a:prstDash val="solid"/>
+                      <a:round/>
+                      <a:headEnd len="med" w="med" type="none"/>
+                      <a:tailEnd len="med" w="med" type="none"/>
+                    </a:lnB>
+                  </a:tcPr>
+                </a:tc>
+                <a:tc>
+                  <a:txBody>
+                    <a:bodyPr>
+                      <a:noAutofit/>
+                    </a:bodyPr>
+                    <a:lstStyle/>
+                    <a:p>
+                      <a:pPr lvl="0" rtl="0" algn="ctr">
+                        <a:spcBef>
+                          <a:spcPts val="0"/>
+                        </a:spcBef>
+                        <a:buNone/>
+                      </a:pPr>
+                      <a:r>
+                        <a:rPr lang="en-US" sz="1800"/>
+                        <a:t>15</a:t>
+                      </a:r>
+                    </a:p>
+                  </a:txBody>
+                  <a:tcPr marT="91425" marB="91425" marR="91425" marL="91425" anchor="ctr">
+                    <a:lnR cap="flat" cmpd="sng" w="38100">
+                      <a:solidFill>
+                        <a:srgbClr val="9E9E9E"/>
+                      </a:solidFill>
+                      <a:prstDash val="solid"/>
+                      <a:round/>
+                      <a:headEnd len="med" w="med" type="none"/>
+                      <a:tailEnd len="med" w="med" type="none"/>
+                    </a:lnR>
+                    <a:lnT cap="flat" cmpd="sng" w="19050">
+                      <a:solidFill>
+                        <a:srgbClr val="9E9E9E"/>
+                      </a:solidFill>
+                      <a:prstDash val="solid"/>
+                      <a:round/>
+                      <a:headEnd len="med" w="med" type="none"/>
+                      <a:tailEnd len="med" w="med" type="none"/>
+                    </a:lnT>
+                    <a:lnB cap="flat" cmpd="sng" w="38100">
+                      <a:solidFill>
+                        <a:srgbClr val="9E9E9E"/>
+                      </a:solidFill>
+                      <a:prstDash val="solid"/>
+                      <a:round/>
+                      <a:headEnd len="med" w="med" type="none"/>
+                      <a:tailEnd len="med" w="med" type="none"/>
+                    </a:lnB>
+                  </a:tcPr>
+                </a:tc>
+                <a:tc>
+                  <a:txBody>
+                    <a:bodyPr>
+                      <a:noAutofit/>
+                    </a:bodyPr>
+                    <a:lstStyle/>
+                    <a:p>
+                      <a:pPr lvl="0" rtl="0" algn="ctr">
+                        <a:spcBef>
+                          <a:spcPts val="0"/>
+                        </a:spcBef>
+                        <a:buNone/>
+                      </a:pPr>
+                      <a:r>
                         <a:rPr b="1" lang="en-US" sz="1800"/>
-                        <a:t>Sum</a:t>
+                        <a:t>70</a:t>
+                      </a:r>
+                    </a:p>
+                  </a:txBody>
+                  <a:tcPr marT="91425" marB="91425" marR="91425" marL="91425" anchor="ctr">
+                    <a:lnL cap="flat" cmpd="sng" w="38100">
+                      <a:solidFill>
+                        <a:srgbClr val="9E9E9E"/>
+                      </a:solidFill>
+                      <a:prstDash val="solid"/>
+                      <a:round/>
+                      <a:headEnd len="med" w="med" type="none"/>
+                      <a:tailEnd len="med" w="med" type="none"/>
+                    </a:lnL>
+                    <a:lnR cap="flat" cmpd="sng" w="38100">
+                      <a:solidFill>
+                        <a:srgbClr val="9E9E9E"/>
+                      </a:solidFill>
+                      <a:prstDash val="solid"/>
+                      <a:round/>
+                      <a:headEnd len="med" w="med" type="none"/>
+                      <a:tailEnd len="med" w="med" type="none"/>
+                    </a:lnR>
+                    <a:lnT cap="flat" cmpd="sng" w="38100">
+                      <a:solidFill>
+                        <a:srgbClr val="9E9E9E"/>
+                      </a:solidFill>
+                      <a:prstDash val="solid"/>
+                      <a:round/>
+                      <a:headEnd len="med" w="med" type="none"/>
+                      <a:tailEnd len="med" w="med" type="none"/>
+                    </a:lnT>
+                    <a:lnB cap="flat" cmpd="sng" w="38100">
+                      <a:solidFill>
+                        <a:srgbClr val="9E9E9E"/>
+                      </a:solidFill>
+                      <a:prstDash val="solid"/>
+                      <a:round/>
+                      <a:headEnd len="med" w="med" type="none"/>
+                      <a:tailEnd len="med" w="med" type="none"/>
+                    </a:lnB>
+                  </a:tcPr>
+                </a:tc>
+              </a:tr>
+              <a:tr h="381000">
+                <a:tc>
+                  <a:txBody>
+                    <a:bodyPr>
+                      <a:noAutofit/>
+                    </a:bodyPr>
+                    <a:lstStyle/>
+                    <a:p>
+                      <a:pPr lvl="0" rtl="0" algn="ctr">
+                        <a:spcBef>
+                          <a:spcPts val="0"/>
+                        </a:spcBef>
+                        <a:buNone/>
+                      </a:pPr>
+                      <a:r>
+                        <a:rPr b="1" lang="en-US" sz="1800"/>
+                        <a:t>Szumma</a:t>
                       </a:r>
                     </a:p>
                   </a:txBody>
@@ -25546,7 +25733,7 @@
                       </a:pPr>
                       <a:r>
                         <a:rPr b="1" lang="en-US" sz="1800"/>
-                        <a:t>71</a:t>
+                        <a:t>96</a:t>
                       </a:r>
                     </a:p>
                   </a:txBody>
@@ -25604,7 +25791,7 @@
                       </a:pPr>
                       <a:r>
                         <a:rPr b="1" lang="en-US" sz="1800"/>
-                        <a:t>60</a:t>
+                        <a:t>75</a:t>
                       </a:r>
                     </a:p>
                   </a:txBody>
@@ -25662,7 +25849,7 @@
                       </a:pPr>
                       <a:r>
                         <a:rPr b="1" lang="en-US" sz="1800"/>
-                        <a:t>58</a:t>
+                        <a:t>75</a:t>
                       </a:r>
                     </a:p>
                   </a:txBody>
@@ -25720,7 +25907,7 @@
                       </a:pPr>
                       <a:r>
                         <a:rPr b="1" lang="en-US" sz="1800"/>
-                        <a:t>69</a:t>
+                        <a:t>84</a:t>
                       </a:r>
                     </a:p>
                   </a:txBody>
@@ -25777,8 +25964,8 @@
                         <a:buNone/>
                       </a:pPr>
                       <a:r>
-                        <a:rPr b="1" lang="en-US" sz="1800"/>
-                        <a:t>258</a:t>
+                        <a:rPr b="1" i="1" lang="en-US" sz="1800"/>
+                        <a:t>328</a:t>
                       </a:r>
                     </a:p>
                   </a:txBody>
@@ -26480,7 +26667,7 @@
             <a:tbl>
               <a:tblPr>
                 <a:noFill/>
-                <a:tableStyleId>{D416E318-9AFB-412E-AE63-A0A0E59EB3B7}</a:tableStyleId>
+                <a:tableStyleId>{EE4A90BB-7914-41D3-B846-49A67E4F97CD}</a:tableStyleId>
               </a:tblPr>
               <a:tblGrid>
                 <a:gridCol w="4115875"/>
@@ -26978,7 +27165,7 @@
             <a:tbl>
               <a:tblPr>
                 <a:noFill/>
-                <a:tableStyleId>{D416E318-9AFB-412E-AE63-A0A0E59EB3B7}</a:tableStyleId>
+                <a:tableStyleId>{EE4A90BB-7914-41D3-B846-49A67E4F97CD}</a:tableStyleId>
               </a:tblPr>
               <a:tblGrid>
                 <a:gridCol w="3619500"/>
@@ -27547,7 +27734,7 @@
             <a:tbl>
               <a:tblPr>
                 <a:noFill/>
-                <a:tableStyleId>{D416E318-9AFB-412E-AE63-A0A0E59EB3B7}</a:tableStyleId>
+                <a:tableStyleId>{EE4A90BB-7914-41D3-B846-49A67E4F97CD}</a:tableStyleId>
               </a:tblPr>
               <a:tblGrid>
                 <a:gridCol w="4336950"/>
@@ -31372,7 +31559,7 @@
             <a:tbl>
               <a:tblPr>
                 <a:noFill/>
-                <a:tableStyleId>{4BBB43DB-4290-4700-B429-9A54DBDE9A83}</a:tableStyleId>
+                <a:tableStyleId>{294A0267-038B-4630-BD29-FE667983F80A}</a:tableStyleId>
               </a:tblPr>
               <a:tblGrid>
                 <a:gridCol w="523600"/>
@@ -40417,7 +40604,7 @@
           <p:nvPr/>
         </p:nvPicPr>
         <p:blipFill>
-          <a:blip r:embed="rId4">
+          <a:blip r:embed="rId3">
             <a:alphaModFix/>
           </a:blip>
           <a:stretch>
@@ -40426,8 +40613,8 @@
         </p:blipFill>
         <p:spPr>
           <a:xfrm>
-            <a:off x="782587" y="1085037"/>
-            <a:ext cx="7578824" cy="4687924"/>
+            <a:off x="501537" y="1047112"/>
+            <a:ext cx="8331424" cy="5150335"/>
           </a:xfrm>
           <a:prstGeom prst="rect">
             <a:avLst/>
@@ -41577,8 +41764,8 @@
         </p:nvSpPr>
         <p:spPr>
           <a:xfrm>
-            <a:off x="210678" y="1034612"/>
-            <a:ext cx="8790600" cy="5175300"/>
+            <a:off x="176700" y="1140599"/>
+            <a:ext cx="8790600" cy="4576800"/>
           </a:xfrm>
           <a:prstGeom prst="rect">
             <a:avLst/>
@@ -44542,7 +44729,7 @@
           <p:nvPr/>
         </p:nvPicPr>
         <p:blipFill>
-          <a:blip r:embed="rId4">
+          <a:blip r:embed="rId3">
             <a:alphaModFix/>
           </a:blip>
           <a:stretch>
@@ -44940,9 +45127,9 @@
 </file>
 
 <file path=ppt/theme/theme1.xml><?xml version="1.0" encoding="utf-8"?>
-<a:theme xmlns:a="http://schemas.openxmlformats.org/drawingml/2006/main" xmlns:r="http://schemas.openxmlformats.org/officeDocument/2006/relationships" name="Custom Theme">
+<a:theme xmlns:a="http://schemas.openxmlformats.org/drawingml/2006/main" xmlns:r="http://schemas.openxmlformats.org/officeDocument/2006/relationships" name="Office-téma">
   <a:themeElements>
-    <a:clrScheme name="Default">
+    <a:clrScheme name="Office-téma">
       <a:dk1>
         <a:srgbClr val="000000"/>
       </a:dk1>
@@ -44950,34 +45137,34 @@
         <a:srgbClr val="FFFFFF"/>
       </a:lt1>
       <a:dk2>
-        <a:srgbClr val="158158"/>
+        <a:srgbClr val="44546A"/>
       </a:dk2>
       <a:lt2>
-        <a:srgbClr val="F3F3F3"/>
+        <a:srgbClr val="E7E6E6"/>
       </a:lt2>
       <a:accent1>
-        <a:srgbClr val="058DC7"/>
+        <a:srgbClr val="5B9BD5"/>
       </a:accent1>
       <a:accent2>
-        <a:srgbClr val="50B432"/>
+        <a:srgbClr val="ED7D31"/>
       </a:accent2>
       <a:accent3>
-        <a:srgbClr val="ED561B"/>
+        <a:srgbClr val="A5A5A5"/>
       </a:accent3>
       <a:accent4>
-        <a:srgbClr val="EDEF00"/>
+        <a:srgbClr val="FFC000"/>
       </a:accent4>
       <a:accent5>
-        <a:srgbClr val="24CBE5"/>
+        <a:srgbClr val="4472C4"/>
       </a:accent5>
       <a:accent6>
-        <a:srgbClr val="64E572"/>
+        <a:srgbClr val="70AD47"/>
       </a:accent6>
       <a:hlink>
-        <a:srgbClr val="2200CC"/>
+        <a:srgbClr val="0563C1"/>
       </a:hlink>
       <a:folHlink>
-        <a:srgbClr val="551A8B"/>
+        <a:srgbClr val="954F72"/>
       </a:folHlink>
     </a:clrScheme>
     <a:fontScheme name="Office">
@@ -45498,9 +45685,9 @@
 </file>
 
 <file path=ppt/theme/theme3.xml><?xml version="1.0" encoding="utf-8"?>
-<a:theme xmlns:a="http://schemas.openxmlformats.org/drawingml/2006/main" xmlns:r="http://schemas.openxmlformats.org/officeDocument/2006/relationships" name="Office-téma">
+<a:theme xmlns:a="http://schemas.openxmlformats.org/drawingml/2006/main" xmlns:r="http://schemas.openxmlformats.org/officeDocument/2006/relationships" name="Custom Theme">
   <a:themeElements>
-    <a:clrScheme name="Office-téma">
+    <a:clrScheme name="Default">
       <a:dk1>
         <a:srgbClr val="000000"/>
       </a:dk1>
@@ -45508,34 +45695,34 @@
         <a:srgbClr val="FFFFFF"/>
       </a:lt1>
       <a:dk2>
-        <a:srgbClr val="44546A"/>
+        <a:srgbClr val="158158"/>
       </a:dk2>
       <a:lt2>
-        <a:srgbClr val="E7E6E6"/>
+        <a:srgbClr val="F3F3F3"/>
       </a:lt2>
       <a:accent1>
-        <a:srgbClr val="5B9BD5"/>
+        <a:srgbClr val="058DC7"/>
       </a:accent1>
       <a:accent2>
-        <a:srgbClr val="ED7D31"/>
+        <a:srgbClr val="50B432"/>
       </a:accent2>
       <a:accent3>
-        <a:srgbClr val="A5A5A5"/>
+        <a:srgbClr val="ED561B"/>
       </a:accent3>
       <a:accent4>
-        <a:srgbClr val="FFC000"/>
+        <a:srgbClr val="EDEF00"/>
       </a:accent4>
       <a:accent5>
-        <a:srgbClr val="4472C4"/>
+        <a:srgbClr val="24CBE5"/>
       </a:accent5>
       <a:accent6>
-        <a:srgbClr val="70AD47"/>
+        <a:srgbClr val="64E572"/>
       </a:accent6>
       <a:hlink>
-        <a:srgbClr val="0563C1"/>
+        <a:srgbClr val="2200CC"/>
       </a:hlink>
       <a:folHlink>
-        <a:srgbClr val="954F72"/>
+        <a:srgbClr val="551A8B"/>
       </a:folHlink>
     </a:clrScheme>
     <a:fontScheme name="Office">

</xml_diff>

<commit_message>
+ up-to-date .pptx .docx .pdf
</commit_message>
<xml_diff>
--- a/train-validate-test-repeat-vitmav45-beszamolo.pptx
+++ b/train-validate-test-repeat-vitmav45-beszamolo.pptx
@@ -23318,7 +23318,7 @@
             <a:tbl>
               <a:tblPr>
                 <a:noFill/>
-                <a:tableStyleId>{EE4A90BB-7914-41D3-B846-49A67E4F97CD}</a:tableStyleId>
+                <a:tableStyleId>{30BCC980-B1AF-4FEF-85EA-2FC768ABBB76}</a:tableStyleId>
               </a:tblPr>
               <a:tblGrid>
                 <a:gridCol w="1966825"/>
@@ -24393,7 +24393,7 @@
                       </a:pPr>
                       <a:r>
                         <a:rPr b="1" lang="en-US" sz="1800"/>
-                        <a:t>40</a:t>
+                        <a:t>42</a:t>
                       </a:r>
                     </a:p>
                   </a:txBody>
@@ -25437,7 +25437,7 @@
                       </a:pPr>
                       <a:r>
                         <a:rPr lang="en-US" sz="1800"/>
-                        <a:t>25</a:t>
+                        <a:t>28</a:t>
                       </a:r>
                     </a:p>
                   </a:txBody>
@@ -25486,7 +25486,7 @@
                       </a:pPr>
                       <a:r>
                         <a:rPr lang="en-US" sz="1800"/>
-                        <a:t>15</a:t>
+                        <a:t>20</a:t>
                       </a:r>
                     </a:p>
                   </a:txBody>
@@ -25526,7 +25526,7 @@
                       </a:pPr>
                       <a:r>
                         <a:rPr lang="en-US" sz="1800"/>
-                        <a:t>15</a:t>
+                        <a:t>20</a:t>
                       </a:r>
                     </a:p>
                   </a:txBody>
@@ -25615,7 +25615,7 @@
                       </a:pPr>
                       <a:r>
                         <a:rPr b="1" lang="en-US" sz="1800"/>
-                        <a:t>70</a:t>
+                        <a:t>83</a:t>
                       </a:r>
                     </a:p>
                   </a:txBody>
@@ -25733,7 +25733,7 @@
                       </a:pPr>
                       <a:r>
                         <a:rPr b="1" lang="en-US" sz="1800"/>
-                        <a:t>96</a:t>
+                        <a:t>99</a:t>
                       </a:r>
                     </a:p>
                   </a:txBody>
@@ -25791,7 +25791,7 @@
                       </a:pPr>
                       <a:r>
                         <a:rPr b="1" lang="en-US" sz="1800"/>
-                        <a:t>75</a:t>
+                        <a:t>80</a:t>
                       </a:r>
                     </a:p>
                   </a:txBody>
@@ -25849,7 +25849,7 @@
                       </a:pPr>
                       <a:r>
                         <a:rPr b="1" lang="en-US" sz="1800"/>
-                        <a:t>75</a:t>
+                        <a:t>80</a:t>
                       </a:r>
                     </a:p>
                   </a:txBody>
@@ -25965,7 +25965,7 @@
                       </a:pPr>
                       <a:r>
                         <a:rPr b="1" i="1" lang="en-US" sz="1800"/>
-                        <a:t>328</a:t>
+                        <a:t>343</a:t>
                       </a:r>
                     </a:p>
                   </a:txBody>
@@ -26667,7 +26667,7 @@
             <a:tbl>
               <a:tblPr>
                 <a:noFill/>
-                <a:tableStyleId>{EE4A90BB-7914-41D3-B846-49A67E4F97CD}</a:tableStyleId>
+                <a:tableStyleId>{30BCC980-B1AF-4FEF-85EA-2FC768ABBB76}</a:tableStyleId>
               </a:tblPr>
               <a:tblGrid>
                 <a:gridCol w="4115875"/>
@@ -27165,7 +27165,7 @@
             <a:tbl>
               <a:tblPr>
                 <a:noFill/>
-                <a:tableStyleId>{EE4A90BB-7914-41D3-B846-49A67E4F97CD}</a:tableStyleId>
+                <a:tableStyleId>{30BCC980-B1AF-4FEF-85EA-2FC768ABBB76}</a:tableStyleId>
               </a:tblPr>
               <a:tblGrid>
                 <a:gridCol w="3619500"/>
@@ -27734,7 +27734,7 @@
             <a:tbl>
               <a:tblPr>
                 <a:noFill/>
-                <a:tableStyleId>{EE4A90BB-7914-41D3-B846-49A67E4F97CD}</a:tableStyleId>
+                <a:tableStyleId>{30BCC980-B1AF-4FEF-85EA-2FC768ABBB76}</a:tableStyleId>
               </a:tblPr>
               <a:tblGrid>
                 <a:gridCol w="4336950"/>
@@ -31559,7 +31559,7 @@
             <a:tbl>
               <a:tblPr>
                 <a:noFill/>
-                <a:tableStyleId>{294A0267-038B-4630-BD29-FE667983F80A}</a:tableStyleId>
+                <a:tableStyleId>{38192677-2D9B-4A0D-92FA-7B8146FB3DC1}</a:tableStyleId>
               </a:tblPr>
               <a:tblGrid>
                 <a:gridCol w="523600"/>

</xml_diff>